<commit_message>
Update design constraint analysis version 2, incorporate team member and staff feedback
</commit_message>
<xml_diff>
--- a/doc/Team5DesignConstraints.pptx
+++ b/doc/Team5DesignConstraints.pptx
@@ -4681,11 +4681,11 @@
   <p:clrMapOvr>
     <a:masterClrMapping/>
   </p:clrMapOvr>
-  <mc:AlternateContent xmlns:mc="http://schemas.openxmlformats.org/markup-compatibility/2006">
-    <mc:Choice xmlns:p14="http://schemas.microsoft.com/office/powerpoint/2010/main" Requires="p14">
+  <mc:AlternateContent xmlns:mc="http://schemas.openxmlformats.org/markup-compatibility/2006" xmlns:p14="http://schemas.microsoft.com/office/powerpoint/2010/main">
+    <mc:Choice Requires="p14">
       <p:transition spd="slow" p14:dur="2000"/>
     </mc:Choice>
-    <mc:Fallback>
+    <mc:Fallback xmlns="">
       <p:transition spd="slow"/>
     </mc:Fallback>
   </mc:AlternateContent>
@@ -4987,11 +4987,11 @@
   <p:clrMapOvr>
     <a:masterClrMapping/>
   </p:clrMapOvr>
-  <mc:AlternateContent xmlns:mc="http://schemas.openxmlformats.org/markup-compatibility/2006">
-    <mc:Choice xmlns:p14="http://schemas.microsoft.com/office/powerpoint/2010/main" Requires="p14">
+  <mc:AlternateContent xmlns:mc="http://schemas.openxmlformats.org/markup-compatibility/2006" xmlns:p14="http://schemas.microsoft.com/office/powerpoint/2010/main">
+    <mc:Choice Requires="p14">
       <p:transition spd="slow" p14:dur="2000"/>
     </mc:Choice>
-    <mc:Fallback>
+    <mc:Fallback xmlns="">
       <p:transition spd="slow"/>
     </mc:Fallback>
   </mc:AlternateContent>
@@ -5242,11 +5242,11 @@
   <p:clrMapOvr>
     <a:masterClrMapping/>
   </p:clrMapOvr>
-  <mc:AlternateContent xmlns:mc="http://schemas.openxmlformats.org/markup-compatibility/2006">
-    <mc:Choice xmlns:p14="http://schemas.microsoft.com/office/powerpoint/2010/main" Requires="p14">
+  <mc:AlternateContent xmlns:mc="http://schemas.openxmlformats.org/markup-compatibility/2006" xmlns:p14="http://schemas.microsoft.com/office/powerpoint/2010/main">
+    <mc:Choice Requires="p14">
       <p:transition spd="slow" p14:dur="2000"/>
     </mc:Choice>
-    <mc:Fallback>
+    <mc:Fallback xmlns="">
       <p:transition spd="slow"/>
     </mc:Fallback>
   </mc:AlternateContent>
@@ -5306,20 +5306,32 @@
         <p:spPr/>
         <p:txBody>
           <a:bodyPr>
-            <a:normAutofit fontScale="85000" lnSpcReduction="10000"/>
+            <a:normAutofit fontScale="92500"/>
           </a:bodyPr>
           <a:lstStyle/>
           <a:p>
             <a:r>
               <a:rPr lang="en-US" dirty="0"/>
-              <a:t>We propose to build an augmented reality simulator</a:t>
-            </a:r>
-          </a:p>
-          <a:p>
-            <a:pPr lvl="1"/>
+              <a:t>We propose </a:t>
+            </a:r>
+            <a:r>
+              <a:rPr lang="en-US" dirty="0" smtClean="0"/>
+              <a:t>an </a:t>
+            </a:r>
+            <a:r>
+              <a:rPr lang="en-US" i="1" dirty="0"/>
+              <a:t>augmented reality simulator</a:t>
+            </a:r>
+          </a:p>
+          <a:p>
+            <a:pPr lvl="1"/>
+            <a:r>
+              <a:rPr lang="en-US" dirty="0" smtClean="0"/>
+              <a:t>Allows </a:t>
+            </a:r>
             <a:r>
               <a:rPr lang="en-US" dirty="0"/>
-              <a:t>Allows at least one user to play an electronic game in a mobile, outdoor environment</a:t>
+              <a:t>at least one user to play an electronic game in a mobile, outdoor environment</a:t>
             </a:r>
           </a:p>
           <a:p>
@@ -5363,15 +5375,29 @@
             </a:r>
             <a:r>
               <a:rPr lang="en-US" dirty="0"/>
-              <a:t> is portable, worn by the user, and displays images over the user’s view of the environment</a:t>
-            </a:r>
-          </a:p>
-          <a:p>
-            <a:pPr lvl="2"/>
+              <a:t> is </a:t>
+            </a:r>
+            <a:r>
+              <a:rPr lang="en-US" dirty="0" smtClean="0"/>
+              <a:t>worn </a:t>
+            </a:r>
             <a:r>
               <a:rPr lang="en-US" dirty="0"/>
-              <a:t>Headsets will overlay game-object pixels displayed by an LED display onto a half-silvered mirror that is suspended in front of the user’s eyes.</a:t>
-            </a:r>
+              <a:t>by the </a:t>
+            </a:r>
+            <a:r>
+              <a:rPr lang="en-US" dirty="0" smtClean="0"/>
+              <a:t>user and overlays images of game objects on the user’s </a:t>
+            </a:r>
+            <a:r>
+              <a:rPr lang="en-US" dirty="0" smtClean="0"/>
+              <a:t>view of the </a:t>
+            </a:r>
+            <a:r>
+              <a:rPr lang="en-US" dirty="0" smtClean="0"/>
+              <a:t>environment</a:t>
+            </a:r>
+            <a:endParaRPr lang="en-US" dirty="0"/>
           </a:p>
           <a:p>
             <a:pPr lvl="1"/>
@@ -5380,16 +5406,20 @@
               <a:t>The </a:t>
             </a:r>
             <a:r>
-              <a:rPr lang="en-US" b="1" dirty="0"/>
+              <a:rPr lang="en-US" b="1" dirty="0" smtClean="0"/>
               <a:t>CCU</a:t>
             </a:r>
             <a:r>
-              <a:rPr lang="en-US" dirty="0"/>
-              <a:t> is not portable. It will communicate information to the headset about simulation logic</a:t>
-            </a:r>
-            <a:r>
-              <a:rPr lang="en-US" dirty="0" smtClean="0"/>
-              <a:t>.</a:t>
+              <a:rPr lang="en-US" dirty="0" smtClean="0"/>
+              <a:t> </a:t>
+            </a:r>
+            <a:r>
+              <a:rPr lang="en-US" dirty="0" smtClean="0"/>
+              <a:t>remains stationary and </a:t>
+            </a:r>
+            <a:r>
+              <a:rPr lang="en-US" dirty="0" smtClean="0"/>
+              <a:t>communicates information to the headset about simulation logic.</a:t>
             </a:r>
             <a:endParaRPr lang="en-US" dirty="0"/>
           </a:p>
@@ -5692,13 +5722,38 @@
           <a:p>
             <a:r>
               <a:rPr lang="en-US" dirty="0"/>
-              <a:t>An ability to inform the user of a headset about the status and quality of the wireless connection to the central control unit.</a:t>
-            </a:r>
+              <a:t>An ability to </a:t>
+            </a:r>
+            <a:r>
+              <a:rPr lang="en-US" dirty="0" smtClean="0"/>
+              <a:t>monitor and display the status and quality of the wireless connection to the central control unit.</a:t>
+            </a:r>
+            <a:endParaRPr lang="en-US" dirty="0"/>
           </a:p>
           <a:p>
             <a:r>
               <a:rPr lang="en-US" dirty="0"/>
-              <a:t>An ability to load graphics for a new simulation to the headset without re-flashing the software on the headset’s microcontroller</a:t>
+              <a:t>An ability to load </a:t>
+            </a:r>
+            <a:r>
+              <a:rPr lang="en-US" dirty="0" smtClean="0"/>
+              <a:t>headset </a:t>
+            </a:r>
+            <a:r>
+              <a:rPr lang="en-US" dirty="0" smtClean="0"/>
+              <a:t>graphics </a:t>
+            </a:r>
+            <a:r>
+              <a:rPr lang="en-US" dirty="0"/>
+              <a:t>for a new simulation </a:t>
+            </a:r>
+            <a:r>
+              <a:rPr lang="en-US" dirty="0" smtClean="0"/>
+              <a:t>without re-flashing </a:t>
+            </a:r>
+            <a:r>
+              <a:rPr lang="en-US" dirty="0"/>
+              <a:t>software on the headset’s microcontroller</a:t>
             </a:r>
             <a:r>
               <a:rPr lang="en-US" dirty="0" smtClean="0"/>
@@ -5822,13 +5877,8 @@
             <a:pPr lvl="1"/>
             <a:r>
               <a:rPr lang="en-US" dirty="0" smtClean="0"/>
-              <a:t>GPS (#2) and IMU (#1</a:t>
-            </a:r>
-            <a:r>
-              <a:rPr lang="en-US" dirty="0" smtClean="0"/>
-              <a:t>) interfacing</a:t>
-            </a:r>
-            <a:endParaRPr lang="en-US" dirty="0" smtClean="0"/>
+              <a:t>GPS (#2) and IMU (#1) interfacing</a:t>
+            </a:r>
           </a:p>
           <a:p>
             <a:pPr lvl="1"/>
@@ -5841,21 +5891,8 @@
             <a:pPr lvl="1"/>
             <a:r>
               <a:rPr lang="en-US" dirty="0" smtClean="0"/>
-              <a:t>Battery </a:t>
-            </a:r>
-            <a:r>
-              <a:rPr lang="en-US" dirty="0" smtClean="0"/>
-              <a:t>monitor </a:t>
-            </a:r>
-            <a:r>
-              <a:rPr lang="en-US" dirty="0" smtClean="0"/>
-              <a:t>(#3</a:t>
-            </a:r>
-            <a:r>
-              <a:rPr lang="en-US" dirty="0" smtClean="0"/>
-              <a:t>) interfacing</a:t>
-            </a:r>
-            <a:endParaRPr lang="en-US" dirty="0" smtClean="0"/>
+              <a:t>Battery monitor (#3) interfacing</a:t>
+            </a:r>
           </a:p>
           <a:p>
             <a:r>
@@ -6021,26 +6058,14 @@
             <a:pPr lvl="1"/>
             <a:r>
               <a:rPr lang="en-US" dirty="0" smtClean="0"/>
-              <a:t>1 I2C (Power </a:t>
-            </a:r>
-            <a:r>
-              <a:rPr lang="en-US" dirty="0" smtClean="0"/>
-              <a:t>Monitor, IMU</a:t>
-            </a:r>
-            <a:r>
-              <a:rPr lang="en-US" dirty="0" smtClean="0"/>
-              <a:t>)</a:t>
-            </a:r>
-          </a:p>
-          <a:p>
-            <a:pPr lvl="1"/>
-            <a:r>
-              <a:rPr lang="en-US" dirty="0" smtClean="0"/>
-              <a:t>At least 10 additional GPIO </a:t>
-            </a:r>
-            <a:r>
-              <a:rPr lang="en-US" dirty="0" smtClean="0"/>
-              <a:t>pins</a:t>
+              <a:t>1 I2C (Power Monitor, IMU)</a:t>
+            </a:r>
+          </a:p>
+          <a:p>
+            <a:pPr lvl="1"/>
+            <a:r>
+              <a:rPr lang="en-US" dirty="0" smtClean="0"/>
+              <a:t>At least 10 additional GPIO pins</a:t>
             </a:r>
           </a:p>
           <a:p>
@@ -6146,6 +6171,10 @@
           </p:nvPr>
         </p:nvSpPr>
         <p:spPr>
+          <a:xfrm>
+            <a:off x="457200" y="1295400"/>
+            <a:ext cx="4038600" cy="5102352"/>
+          </a:xfrm>
           <a:ln w="57150">
             <a:solidFill>
               <a:srgbClr val="00B050"/>
@@ -6160,7 +6189,6 @@
               <a:rPr lang="en-US" dirty="0" smtClean="0"/>
               <a:t>STM32F405RGT6</a:t>
             </a:r>
-            <a:endParaRPr lang="en-US" dirty="0" smtClean="0"/>
           </a:p>
           <a:p>
             <a:pPr lvl="1"/>
@@ -6184,7 +6212,41 @@
             <a:pPr lvl="1"/>
             <a:r>
               <a:rPr lang="en-US" dirty="0" smtClean="0"/>
-              <a:t>192 KB </a:t>
+              <a:t>192 KB RAM</a:t>
+            </a:r>
+          </a:p>
+          <a:p>
+            <a:pPr lvl="1"/>
+            <a:r>
+              <a:rPr lang="en-US" dirty="0" smtClean="0"/>
+              <a:t>64 LQFP 51 I/O</a:t>
+            </a:r>
+          </a:p>
+          <a:p>
+            <a:pPr lvl="1"/>
+            <a:r>
+              <a:rPr lang="en-US" dirty="0" smtClean="0"/>
+              <a:t>$11 single quantity</a:t>
+            </a:r>
+          </a:p>
+          <a:p>
+            <a:r>
+              <a:rPr lang="en-US" dirty="0" smtClean="0"/>
+              <a:t>Selected because</a:t>
+            </a:r>
+          </a:p>
+          <a:p>
+            <a:pPr lvl="1"/>
+            <a:r>
+              <a:rPr lang="en-US" dirty="0" smtClean="0"/>
+              <a:t>FPU (1 cycle multiply!)</a:t>
+            </a:r>
+          </a:p>
+          <a:p>
+            <a:pPr lvl="1"/>
+            <a:r>
+              <a:rPr lang="en-US" dirty="0" smtClean="0"/>
+              <a:t>Large </a:t>
             </a:r>
             <a:r>
               <a:rPr lang="en-US" dirty="0" smtClean="0"/>
@@ -6195,49 +6257,10 @@
             <a:pPr lvl="1"/>
             <a:r>
               <a:rPr lang="en-US" dirty="0" smtClean="0"/>
-              <a:t>64 LQFP 51 I/O</a:t>
+              <a:t>Independent DMA/ART Accelerator</a:t>
             </a:r>
             <a:endParaRPr lang="en-US" dirty="0" smtClean="0"/>
           </a:p>
-          <a:p>
-            <a:pPr lvl="1"/>
-            <a:r>
-              <a:rPr lang="en-US" dirty="0" smtClean="0"/>
-              <a:t>$11 single quantity</a:t>
-            </a:r>
-          </a:p>
-          <a:p>
-            <a:r>
-              <a:rPr lang="en-US" dirty="0" smtClean="0"/>
-              <a:t>Selected because</a:t>
-            </a:r>
-          </a:p>
-          <a:p>
-            <a:pPr lvl="1"/>
-            <a:r>
-              <a:rPr lang="en-US" dirty="0" smtClean="0"/>
-              <a:t>FPU (1 cycle multiply!)</a:t>
-            </a:r>
-          </a:p>
-          <a:p>
-            <a:pPr lvl="1"/>
-            <a:r>
-              <a:rPr lang="en-US" dirty="0" smtClean="0"/>
-              <a:t>Large </a:t>
-            </a:r>
-            <a:r>
-              <a:rPr lang="en-US" dirty="0" smtClean="0"/>
-              <a:t>RAM</a:t>
-            </a:r>
-          </a:p>
-          <a:p>
-            <a:pPr lvl="1"/>
-            <a:r>
-              <a:rPr lang="en-US" dirty="0" smtClean="0"/>
-              <a:t>Almost all I/O 5VT</a:t>
-            </a:r>
-            <a:endParaRPr lang="en-US" dirty="0" smtClean="0"/>
-          </a:p>
         </p:txBody>
       </p:sp>
       <p:sp>
@@ -6251,6 +6274,10 @@
           </p:nvPr>
         </p:nvSpPr>
         <p:spPr>
+          <a:xfrm>
+            <a:off x="4648200" y="1295400"/>
+            <a:ext cx="4038600" cy="5102352"/>
+          </a:xfrm>
           <a:ln w="57150">
             <a:solidFill>
               <a:srgbClr val="FF0000"/>
@@ -6284,11 +6311,7 @@
             <a:pPr lvl="1"/>
             <a:r>
               <a:rPr lang="en-US" dirty="0" smtClean="0"/>
-              <a:t>128 KB </a:t>
-            </a:r>
-            <a:r>
-              <a:rPr lang="en-US" dirty="0" smtClean="0"/>
-              <a:t>RAM</a:t>
+              <a:t>128 KB RAM</a:t>
             </a:r>
           </a:p>
           <a:p>
@@ -6445,11 +6468,7 @@
             <a:pPr lvl="1"/>
             <a:r>
               <a:rPr lang="en-US" dirty="0" smtClean="0"/>
-              <a:t>Potential future use for complex </a:t>
-            </a:r>
-            <a:r>
-              <a:rPr lang="en-US" dirty="0" smtClean="0"/>
-              <a:t>rendering</a:t>
+              <a:t>Potential future use for complex rendering</a:t>
             </a:r>
           </a:p>
           <a:p>
@@ -6484,11 +6503,7 @@
             <a:pPr lvl="1"/>
             <a:r>
               <a:rPr lang="en-US" dirty="0" smtClean="0"/>
-              <a:t>Display </a:t>
-            </a:r>
-            <a:r>
-              <a:rPr lang="en-US" dirty="0" smtClean="0"/>
-              <a:t>output (HDMI, Composite, VGA)</a:t>
+              <a:t>Display output (HDMI, Composite, VGA)</a:t>
             </a:r>
             <a:endParaRPr lang="en-US" dirty="0"/>
           </a:p>
@@ -6581,6 +6596,10 @@
           </p:nvPr>
         </p:nvSpPr>
         <p:spPr>
+          <a:xfrm>
+            <a:off x="457200" y="1371600"/>
+            <a:ext cx="4038600" cy="5026152"/>
+          </a:xfrm>
           <a:ln w="57150">
             <a:solidFill>
               <a:srgbClr val="00B050"/>
@@ -6634,6 +6653,13 @@
             <a:pPr lvl="1"/>
             <a:r>
               <a:rPr lang="en-US" dirty="0" smtClean="0"/>
+              <a:t>Community support</a:t>
+            </a:r>
+          </a:p>
+          <a:p>
+            <a:pPr lvl="1"/>
+            <a:r>
+              <a:rPr lang="en-US" dirty="0" smtClean="0"/>
               <a:t>Cost</a:t>
             </a:r>
             <a:endParaRPr lang="en-US" dirty="0"/>
@@ -6651,6 +6677,10 @@
           </p:nvPr>
         </p:nvSpPr>
         <p:spPr>
+          <a:xfrm>
+            <a:off x="4648200" y="1371600"/>
+            <a:ext cx="4038600" cy="5026152"/>
+          </a:xfrm>
           <a:ln w="57150">
             <a:solidFill>
               <a:srgbClr val="FF0000"/>
@@ -6697,8 +6727,9 @@
             <a:pPr lvl="1"/>
             <a:r>
               <a:rPr lang="en-US" dirty="0" smtClean="0"/>
-              <a:t>Physical size</a:t>
-            </a:r>
+              <a:t>Learning curve</a:t>
+            </a:r>
+            <a:endParaRPr lang="en-US" dirty="0" smtClean="0"/>
           </a:p>
           <a:p>
             <a:pPr lvl="1"/>
@@ -6756,8 +6787,8 @@
         </p:blipFill>
         <p:spPr bwMode="auto">
           <a:xfrm>
-            <a:off x="2844141" y="4495800"/>
-            <a:ext cx="1499259" cy="1905000"/>
+            <a:off x="2844140" y="4478286"/>
+            <a:ext cx="1499260" cy="1905002"/>
           </a:xfrm>
           <a:prstGeom prst="rect">
             <a:avLst/>
@@ -6795,8 +6826,8 @@
         </p:blipFill>
         <p:spPr bwMode="auto">
           <a:xfrm>
-            <a:off x="5715000" y="4876800"/>
-            <a:ext cx="1981200" cy="1464924"/>
+            <a:off x="5562600" y="4572000"/>
+            <a:ext cx="2393419" cy="1769724"/>
           </a:xfrm>
           <a:prstGeom prst="rect">
             <a:avLst/>

</xml_diff>